<commit_message>
small changes in code formatting for first lection
</commit_message>
<xml_diff>
--- a/lections/cpp_craft_lec_1_part_2_v1_2.pptx
+++ b/lections/cpp_craft_lec_1_part_2_v1_2.pptx
@@ -3537,13 +3537,11 @@
           <a:p>
             <a:r>
               <a:rPr lang="en-US" dirty="0" smtClean="0"/>
-              <a:t>begin() / end()</a:t>
-            </a:r>
-          </a:p>
-          <a:p>
+              <a:t>splice</a:t>
+            </a:r>
             <a:r>
               <a:rPr lang="en-US" dirty="0" smtClean="0"/>
-              <a:t>splice()</a:t>
+              <a:t>()</a:t>
             </a:r>
           </a:p>
           <a:p>
@@ -3559,6 +3557,14 @@
               <a:rPr lang="en-US" dirty="0" smtClean="0"/>
               <a:t>()</a:t>
             </a:r>
+          </a:p>
+          <a:p>
+            <a:r>
+              <a:rPr lang="en-US" dirty="0" smtClean="0"/>
+              <a:t>begin() / end()</a:t>
+            </a:r>
+          </a:p>
+          <a:p>
             <a:endParaRPr lang="en-US" dirty="0"/>
           </a:p>
         </p:txBody>
@@ -4798,25 +4804,8 @@
                 <a:latin typeface="Consolas" pitchFamily="49" charset="0"/>
                 <a:cs typeface="Consolas" pitchFamily="49" charset="0"/>
               </a:rPr>
-              <a:t>[ 10 ] </a:t>
-            </a:r>
-            <a:r>
-              <a:rPr lang="en-US" sz="2000" dirty="0" smtClean="0">
-                <a:solidFill>
-                  <a:schemeClr val="tx1"/>
-                </a:solidFill>
-                <a:latin typeface="Consolas" pitchFamily="49" charset="0"/>
-                <a:cs typeface="Consolas" pitchFamily="49" charset="0"/>
-              </a:rPr>
-              <a:t>);</a:t>
-            </a:r>
-            <a:endParaRPr lang="en-US" sz="2000" dirty="0" smtClean="0">
-              <a:solidFill>
-                <a:schemeClr val="tx1"/>
-              </a:solidFill>
-              <a:latin typeface="Consolas" pitchFamily="49" charset="0"/>
-              <a:cs typeface="Consolas" pitchFamily="49" charset="0"/>
-            </a:endParaRPr>
+              <a:t>[ 10 ] );</a:t>
+            </a:r>
           </a:p>
         </p:txBody>
       </p:sp>
@@ -5100,17 +5089,7 @@
                 <a:latin typeface="Consolas" pitchFamily="49" charset="0"/>
                 <a:cs typeface="Consolas" pitchFamily="49" charset="0"/>
               </a:rPr>
-              <a:t>std</a:t>
-            </a:r>
-            <a:r>
-              <a:rPr lang="en-US" sz="2000" dirty="0" smtClean="0">
-                <a:solidFill>
-                  <a:schemeClr val="tx1"/>
-                </a:solidFill>
-                <a:latin typeface="Consolas" pitchFamily="49" charset="0"/>
-                <a:cs typeface="Consolas" pitchFamily="49" charset="0"/>
-              </a:rPr>
-              <a:t>::list&lt; </a:t>
+              <a:t>std::list&lt; </a:t>
             </a:r>
             <a:r>
               <a:rPr lang="en-US" sz="2000" dirty="0" err="1" smtClean="0">
@@ -5359,11 +5338,7 @@
           <a:p>
             <a:r>
               <a:rPr lang="ru-RU" sz="2400" dirty="0" smtClean="0"/>
-              <a:t>Бьерн Страуструп «Язык программирования С++» - глава «Стандартные контейнеры</a:t>
-            </a:r>
-            <a:r>
-              <a:rPr lang="ru-RU" sz="2400" dirty="0" smtClean="0"/>
-              <a:t>»</a:t>
+              <a:t>Бьерн Страуструп «Язык программирования С++» - глава «Стандартные контейнеры»</a:t>
             </a:r>
             <a:endParaRPr lang="en-US" sz="2400" dirty="0" smtClean="0"/>
           </a:p>
@@ -5406,13 +5381,7 @@
               <a:rPr lang="en-US" sz="2400" dirty="0" smtClean="0">
                 <a:hlinkClick r:id="rId3"/>
               </a:rPr>
-              <a:t>http</a:t>
-            </a:r>
-            <a:r>
-              <a:rPr lang="en-US" sz="2400" dirty="0" smtClean="0">
-                <a:hlinkClick r:id="rId3"/>
-              </a:rPr>
-              <a:t>://blog.alno.name/ru/2008/05/using-boost-smart-pointers</a:t>
+              <a:t>http://blog.alno.name/ru/2008/05/using-boost-smart-pointers</a:t>
             </a:r>
             <a:endParaRPr lang="ru-RU" sz="2400" dirty="0" smtClean="0"/>
           </a:p>
@@ -8152,7 +8121,37 @@
                 <a:latin typeface="Consolas" pitchFamily="49" charset="0"/>
                 <a:cs typeface="Consolas" pitchFamily="49" charset="0"/>
               </a:rPr>
-              <a:t>::in | std::</a:t>
+              <a:t>::in | </a:t>
+            </a:r>
+            <a:r>
+              <a:rPr lang="en-US" dirty="0" smtClean="0">
+                <a:solidFill>
+                  <a:schemeClr val="tx1"/>
+                </a:solidFill>
+                <a:latin typeface="Consolas" pitchFamily="49" charset="0"/>
+                <a:cs typeface="Consolas" pitchFamily="49" charset="0"/>
+              </a:rPr>
+              <a:t>	</a:t>
+            </a:r>
+            <a:r>
+              <a:rPr lang="en-US" dirty="0" smtClean="0">
+                <a:solidFill>
+                  <a:schemeClr val="tx1"/>
+                </a:solidFill>
+                <a:latin typeface="Consolas" pitchFamily="49" charset="0"/>
+                <a:cs typeface="Consolas" pitchFamily="49" charset="0"/>
+              </a:rPr>
+              <a:t>std</a:t>
+            </a:r>
+            <a:r>
+              <a:rPr lang="en-US" dirty="0" smtClean="0">
+                <a:solidFill>
+                  <a:schemeClr val="tx1"/>
+                </a:solidFill>
+                <a:latin typeface="Consolas" pitchFamily="49" charset="0"/>
+                <a:cs typeface="Consolas" pitchFamily="49" charset="0"/>
+              </a:rPr>
+              <a:t>::</a:t>
             </a:r>
             <a:r>
               <a:rPr lang="en-US" dirty="0" err="1" smtClean="0">
@@ -8276,7 +8275,17 @@
                 <a:latin typeface="Consolas" pitchFamily="49" charset="0"/>
                 <a:cs typeface="Consolas" pitchFamily="49" charset="0"/>
               </a:rPr>
-              <a:t>std::</a:t>
+              <a:t>	std</a:t>
+            </a:r>
+            <a:r>
+              <a:rPr lang="en-US" dirty="0" smtClean="0">
+                <a:solidFill>
+                  <a:schemeClr val="tx1"/>
+                </a:solidFill>
+                <a:latin typeface="Consolas" pitchFamily="49" charset="0"/>
+                <a:cs typeface="Consolas" pitchFamily="49" charset="0"/>
+              </a:rPr>
+              <a:t>::</a:t>
             </a:r>
             <a:r>
               <a:rPr lang="en-US" dirty="0" err="1" smtClean="0">

</xml_diff>